<commit_message>
updates PowerPoint and ReadMe doc;
</commit_message>
<xml_diff>
--- a/PowerPoint/UnitTestingInCSharp.pptx
+++ b/PowerPoint/UnitTestingInCSharp.pptx
@@ -5,10 +5,10 @@
     <p:sldMasterId id="2147483684" r:id="rId4"/>
   </p:sldMasterIdLst>
   <p:notesMasterIdLst>
-    <p:notesMasterId r:id="rId24"/>
+    <p:notesMasterId r:id="rId25"/>
   </p:notesMasterIdLst>
   <p:handoutMasterIdLst>
-    <p:handoutMasterId r:id="rId25"/>
+    <p:handoutMasterId r:id="rId26"/>
   </p:handoutMasterIdLst>
   <p:sldIdLst>
     <p:sldId id="257" r:id="rId5"/>
@@ -29,7 +29,8 @@
     <p:sldId id="402" r:id="rId20"/>
     <p:sldId id="279" r:id="rId21"/>
     <p:sldId id="321" r:id="rId22"/>
-    <p:sldId id="391" r:id="rId23"/>
+    <p:sldId id="403" r:id="rId23"/>
+    <p:sldId id="391" r:id="rId24"/>
   </p:sldIdLst>
   <p:sldSz cx="12192000" cy="6858000"/>
   <p:notesSz cx="6858000" cy="9144000"/>
@@ -244,7 +245,7 @@
           <a:p>
             <a:fld id="{C17F2C1D-F243-42AB-ADF2-E7CB4E04900E}" type="datetimeFigureOut">
               <a:rPr lang="en-US" smtClean="0"/>
-              <a:t>10/20/22</a:t>
+              <a:t>11/22/22</a:t>
             </a:fld>
             <a:endParaRPr lang="en-US"/>
           </a:p>
@@ -421,7 +422,7 @@
           <a:p>
             <a:fld id="{020CE34E-5667-4A32-A6BA-10C7A552BC63}" type="datetimeFigureOut">
               <a:rPr lang="en-US" smtClean="0"/>
-              <a:t>10/20/22</a:t>
+              <a:t>11/22/22</a:t>
             </a:fld>
             <a:endParaRPr lang="en-US"/>
           </a:p>
@@ -16510,7 +16511,17 @@
             </a:pPr>
             <a:r>
               <a:rPr lang="en-US" dirty="0"/>
-              <a:t>Passing tests show compliance with requirements</a:t>
+              <a:t>Passing tests show compliance with requirements </a:t>
+            </a:r>
+            <a:r>
+              <a:rPr lang="en-US" dirty="0">
+                <a:solidFill>
+                  <a:srgbClr val="FF0000">
+                    <a:alpha val="60000"/>
+                  </a:srgbClr>
+                </a:solidFill>
+              </a:rPr>
+              <a:t>*</a:t>
             </a:r>
           </a:p>
           <a:p>
@@ -16519,7 +16530,17 @@
             </a:pPr>
             <a:r>
               <a:rPr lang="en-US" dirty="0"/>
-              <a:t>Failing tests show where requirements are not being met</a:t>
+              <a:t>Failing tests show where requirements are not being met </a:t>
+            </a:r>
+            <a:r>
+              <a:rPr lang="en-US" dirty="0">
+                <a:solidFill>
+                  <a:srgbClr val="FF0000">
+                    <a:alpha val="60000"/>
+                  </a:srgbClr>
+                </a:solidFill>
+              </a:rPr>
+              <a:t>*</a:t>
             </a:r>
           </a:p>
           <a:p>
@@ -16768,6 +16789,50 @@
           <a:p>
             <a:pPr algn="ctr"/>
             <a:endParaRPr lang="en-US"/>
+          </a:p>
+        </p:txBody>
+      </p:sp>
+      <p:sp>
+        <p:nvSpPr>
+          <p:cNvPr id="2" name="TextBox 1">
+            <a:extLst>
+              <a:ext uri="{FF2B5EF4-FFF2-40B4-BE49-F238E27FC236}">
+                <a16:creationId xmlns:a16="http://schemas.microsoft.com/office/drawing/2014/main" id="{A7D83959-FEE7-4FDB-F0F5-FA479ED2552E}"/>
+              </a:ext>
+            </a:extLst>
+          </p:cNvPr>
+          <p:cNvSpPr txBox="1"/>
+          <p:nvPr/>
+        </p:nvSpPr>
+        <p:spPr>
+          <a:xfrm>
+            <a:off x="6909936" y="6000948"/>
+            <a:ext cx="4264925" cy="307777"/>
+          </a:xfrm>
+          <a:prstGeom prst="rect">
+            <a:avLst/>
+          </a:prstGeom>
+          <a:noFill/>
+        </p:spPr>
+        <p:txBody>
+          <a:bodyPr wrap="square" rtlCol="0">
+            <a:spAutoFit/>
+          </a:bodyPr>
+          <a:lstStyle/>
+          <a:p>
+            <a:pPr algn="r"/>
+            <a:r>
+              <a:rPr lang="en-US" sz="1400" dirty="0">
+                <a:solidFill>
+                  <a:srgbClr val="FF0000"/>
+                </a:solidFill>
+              </a:rPr>
+              <a:t>*</a:t>
+            </a:r>
+            <a:r>
+              <a:rPr lang="en-US" sz="1400" dirty="0"/>
+              <a:t> False positives/negatives notwithstanding</a:t>
+            </a:r>
           </a:p>
         </p:txBody>
       </p:sp>
@@ -18478,7 +18543,7 @@
             </a:pPr>
             <a:r>
               <a:rPr lang="en-US" dirty="0"/>
-              <a:t>A bit of a grey area here, but generally speaking we are treading into integration testing</a:t>
+              <a:t>A bit of a grey area here, but generally speaking we are treading into integration testing when we start introducing out-of-process services</a:t>
             </a:r>
           </a:p>
           <a:p>
@@ -19346,7 +19411,7 @@
             </a:pPr>
             <a:r>
               <a:rPr lang="en-US" dirty="0"/>
-              <a:t>High code coverage ++++</a:t>
+              <a:t>High code coverage is important, but not a true representation </a:t>
             </a:r>
           </a:p>
           <a:p>
@@ -19907,10 +19972,10 @@
       </p:grpSpPr>
       <p:sp>
         <p:nvSpPr>
-          <p:cNvPr id="22" name="Title 21">
+          <p:cNvPr id="2" name="Title 1">
             <a:extLst>
               <a:ext uri="{FF2B5EF4-FFF2-40B4-BE49-F238E27FC236}">
-                <a16:creationId xmlns:a16="http://schemas.microsoft.com/office/drawing/2014/main" id="{F8FAEED9-1ECD-45F9-87A0-9394BAEABB79}"/>
+                <a16:creationId xmlns:a16="http://schemas.microsoft.com/office/drawing/2014/main" id="{1EF679AD-D6CC-8AF6-89D4-3F79C28DCBF2}"/>
               </a:ext>
             </a:extLst>
           </p:cNvPr>
@@ -19918,32 +19983,27 @@
             <a:spLocks noGrp="1"/>
           </p:cNvSpPr>
           <p:nvPr>
-            <p:ph type="ctrTitle"/>
-          </p:nvPr>
-        </p:nvSpPr>
-        <p:spPr>
-          <a:xfrm>
-            <a:off x="550863" y="549275"/>
-            <a:ext cx="5437187" cy="2986234"/>
-          </a:xfrm>
-        </p:spPr>
+            <p:ph type="title"/>
+          </p:nvPr>
+        </p:nvSpPr>
+        <p:spPr/>
         <p:txBody>
           <a:bodyPr/>
           <a:lstStyle/>
           <a:p>
             <a:r>
               <a:rPr lang="en-US" dirty="0"/>
-              <a:t>Thank You</a:t>
+              <a:t>Resources</a:t>
             </a:r>
           </a:p>
         </p:txBody>
       </p:sp>
       <p:sp>
         <p:nvSpPr>
-          <p:cNvPr id="23" name="Subtitle 22">
+          <p:cNvPr id="3" name="Content Placeholder 2">
             <a:extLst>
               <a:ext uri="{FF2B5EF4-FFF2-40B4-BE49-F238E27FC236}">
-                <a16:creationId xmlns:a16="http://schemas.microsoft.com/office/drawing/2014/main" id="{8E5E4638-9BCB-4C2E-914F-CC868E2020D5}"/>
+                <a16:creationId xmlns:a16="http://schemas.microsoft.com/office/drawing/2014/main" id="{6BA7CBAB-91F6-F9A0-D13A-D90D4D16361C}"/>
               </a:ext>
             </a:extLst>
           </p:cNvPr>
@@ -19951,201 +20011,202 @@
             <a:spLocks noGrp="1"/>
           </p:cNvSpPr>
           <p:nvPr>
-            <p:ph type="subTitle" idx="1"/>
-          </p:nvPr>
-        </p:nvSpPr>
-        <p:spPr>
-          <a:xfrm>
-            <a:off x="550863" y="3827610"/>
-            <a:ext cx="5437187" cy="2265216"/>
-          </a:xfrm>
-        </p:spPr>
+            <p:ph idx="1"/>
+          </p:nvPr>
+        </p:nvSpPr>
+        <p:spPr/>
         <p:txBody>
           <a:bodyPr/>
           <a:lstStyle/>
           <a:p>
             <a:r>
-              <a:rPr lang="en-US" dirty="0"/>
-              <a:t>Presenter name</a:t>
+              <a:rPr lang="en-US" b="0" dirty="0">
+                <a:solidFill>
+                  <a:srgbClr val="D4D4D4"/>
+                </a:solidFill>
+                <a:effectLst/>
+              </a:rPr>
+              <a:t>Structuring Unit Tests </a:t>
             </a:r>
-          </a:p>
-          <a:p>
             <a:r>
-              <a:rPr lang="en-US" dirty="0"/>
-              <a:t>Email address</a:t>
+              <a:rPr lang="en-US" b="0" dirty="0">
+                <a:solidFill>
+                  <a:srgbClr val="D4D4D4"/>
+                </a:solidFill>
+                <a:effectLst/>
+                <a:hlinkClick r:id="rId2"/>
+              </a:rPr>
+              <a:t>https://haacked.com/archive/2012/01/02/structuring-unit-tests.aspx/</a:t>
             </a:r>
-          </a:p>
-          <a:p>
             <a:r>
-              <a:rPr lang="en-US" dirty="0"/>
-              <a:t>Website address</a:t>
+              <a:rPr lang="en-US" b="0" dirty="0">
+                <a:solidFill>
+                  <a:srgbClr val="D4D4D4"/>
+                </a:solidFill>
+                <a:effectLst/>
+              </a:rPr>
+              <a:t> </a:t>
             </a:r>
           </a:p>
+          <a:p>
+            <a:r>
+              <a:rPr lang="en-US" b="0" dirty="0">
+                <a:solidFill>
+                  <a:srgbClr val="D4D4D4"/>
+                </a:solidFill>
+                <a:effectLst/>
+              </a:rPr>
+              <a:t>Unit Testing Dependencies </a:t>
+            </a:r>
+            <a:r>
+              <a:rPr lang="en-US" b="0" dirty="0">
+                <a:solidFill>
+                  <a:srgbClr val="D4D4D4"/>
+                </a:solidFill>
+                <a:effectLst/>
+                <a:hlinkClick r:id="rId3"/>
+              </a:rPr>
+              <a:t>https://enterprisecraftsmanship.com/posts/unit-testing-dependencies/</a:t>
+            </a:r>
+            <a:r>
+              <a:rPr lang="en-US" b="0" dirty="0">
+                <a:solidFill>
+                  <a:srgbClr val="D4D4D4"/>
+                </a:solidFill>
+                <a:effectLst/>
+              </a:rPr>
+              <a:t> </a:t>
+            </a:r>
+          </a:p>
+          <a:p>
+            <a:r>
+              <a:rPr lang="en-US" b="0" dirty="0">
+                <a:solidFill>
+                  <a:srgbClr val="D4D4D4"/>
+                </a:solidFill>
+                <a:effectLst/>
+              </a:rPr>
+              <a:t>Unit Testing in C# </a:t>
+            </a:r>
+            <a:r>
+              <a:rPr lang="en-US" b="0" dirty="0">
+                <a:solidFill>
+                  <a:srgbClr val="D4D4D4"/>
+                </a:solidFill>
+                <a:effectLst/>
+                <a:hlinkClick r:id="rId4"/>
+              </a:rPr>
+              <a:t>https://methodpoet.com/unit-testing-in-c/</a:t>
+            </a:r>
+            <a:r>
+              <a:rPr lang="en-US" b="0" dirty="0">
+                <a:solidFill>
+                  <a:srgbClr val="D4D4D4"/>
+                </a:solidFill>
+                <a:effectLst/>
+              </a:rPr>
+              <a:t> </a:t>
+            </a:r>
+          </a:p>
+          <a:p>
+            <a:r>
+              <a:rPr lang="en-US" b="0" dirty="0">
+                <a:solidFill>
+                  <a:srgbClr val="D4D4D4"/>
+                </a:solidFill>
+                <a:effectLst/>
+              </a:rPr>
+              <a:t>Unit Testing Principles, Practices, and Patterns: Effective testing styles, patterns, and reliable automation for unit testing, mocking, and integration testing with examples in C# </a:t>
+            </a:r>
+            <a:r>
+              <a:rPr lang="en-US" b="0" dirty="0">
+                <a:solidFill>
+                  <a:srgbClr val="D4D4D4"/>
+                </a:solidFill>
+                <a:effectLst/>
+                <a:hlinkClick r:id="rId5"/>
+              </a:rPr>
+              <a:t>https://a.co/bWqis6B</a:t>
+            </a:r>
+            <a:r>
+              <a:rPr lang="en-US" b="0" dirty="0">
+                <a:solidFill>
+                  <a:srgbClr val="D4D4D4"/>
+                </a:solidFill>
+                <a:effectLst/>
+              </a:rPr>
+              <a:t> </a:t>
+            </a:r>
+          </a:p>
+          <a:p>
+            <a:r>
+              <a:rPr lang="en-US" dirty="0">
+                <a:solidFill>
+                  <a:srgbClr val="D4D4D4"/>
+                </a:solidFill>
+              </a:rPr>
+              <a:t>Microsoft Docs </a:t>
+            </a:r>
+            <a:r>
+              <a:rPr lang="en-US" dirty="0">
+                <a:solidFill>
+                  <a:srgbClr val="D4D4D4"/>
+                </a:solidFill>
+                <a:hlinkClick r:id="rId6"/>
+              </a:rPr>
+              <a:t>https://learn.microsoft.com/en-us/search/?terms=unit%20testing%20c%23</a:t>
+            </a:r>
+            <a:r>
+              <a:rPr lang="en-US" dirty="0">
+                <a:solidFill>
+                  <a:srgbClr val="D4D4D4"/>
+                </a:solidFill>
+              </a:rPr>
+              <a:t> </a:t>
+            </a:r>
+          </a:p>
+          <a:p>
+            <a:endParaRPr lang="en-US" b="0" dirty="0">
+              <a:solidFill>
+                <a:srgbClr val="D4D4D4"/>
+              </a:solidFill>
+              <a:effectLst/>
+            </a:endParaRPr>
+          </a:p>
+          <a:p>
+            <a:endParaRPr lang="en-US" b="0" dirty="0">
+              <a:solidFill>
+                <a:srgbClr val="D4D4D4"/>
+              </a:solidFill>
+              <a:effectLst/>
+              <a:latin typeface="Menlo" panose="020B0609030804020204" pitchFamily="49" charset="0"/>
+            </a:endParaRPr>
+          </a:p>
         </p:txBody>
       </p:sp>
-      <p:pic>
-        <p:nvPicPr>
-          <p:cNvPr id="27" name="Picture Placeholder 26" descr="Data Points Digital background">
+      <p:sp>
+        <p:nvSpPr>
+          <p:cNvPr id="6" name="Slide Number Placeholder 5">
             <a:extLst>
               <a:ext uri="{FF2B5EF4-FFF2-40B4-BE49-F238E27FC236}">
-                <a16:creationId xmlns:a16="http://schemas.microsoft.com/office/drawing/2014/main" id="{9E660784-34E2-4CDA-926A-DDD6AAF35046}"/>
+                <a16:creationId xmlns:a16="http://schemas.microsoft.com/office/drawing/2014/main" id="{13E14DE2-B352-017A-A5E9-9D1718AFEB7E}"/>
               </a:ext>
             </a:extLst>
           </p:cNvPr>
-          <p:cNvPicPr>
-            <a:picLocks noGrp="1" noChangeAspect="1"/>
-          </p:cNvPicPr>
-          <p:nvPr>
-            <p:ph type="pic" sz="quarter" idx="15"/>
-          </p:nvPr>
-        </p:nvPicPr>
-        <p:blipFill rotWithShape="1">
-          <a:blip r:embed="rId2" cstate="screen">
-            <a:extLst>
-              <a:ext uri="{28A0092B-C50C-407E-A947-70E740481C1C}">
-                <a14:useLocalDpi xmlns:a14="http://schemas.microsoft.com/office/drawing/2010/main" val="0"/>
-              </a:ext>
-            </a:extLst>
-          </a:blip>
-          <a:srcRect/>
-          <a:stretch/>
-        </p:blipFill>
-        <p:spPr>
-          <a:xfrm>
-            <a:off x="6556248" y="548640"/>
-            <a:ext cx="5084064" cy="2880360"/>
-          </a:xfrm>
-        </p:spPr>
-      </p:pic>
-      <p:pic>
-        <p:nvPicPr>
-          <p:cNvPr id="33" name="Picture Placeholder 32" descr="Data Points Digital background">
-            <a:extLst>
-              <a:ext uri="{FF2B5EF4-FFF2-40B4-BE49-F238E27FC236}">
-                <a16:creationId xmlns:a16="http://schemas.microsoft.com/office/drawing/2014/main" id="{48106962-23C6-4DFE-BB3A-E5FFF03F38CE}"/>
-              </a:ext>
-            </a:extLst>
-          </p:cNvPr>
-          <p:cNvPicPr>
-            <a:picLocks noGrp="1" noChangeAspect="1"/>
-          </p:cNvPicPr>
-          <p:nvPr>
-            <p:ph type="pic" sz="quarter" idx="16"/>
-          </p:nvPr>
-        </p:nvPicPr>
-        <p:blipFill rotWithShape="1">
-          <a:blip r:embed="rId3" cstate="screen">
-            <a:extLst>
-              <a:ext uri="{28A0092B-C50C-407E-A947-70E740481C1C}">
-                <a14:useLocalDpi xmlns:a14="http://schemas.microsoft.com/office/drawing/2010/main" val="0"/>
-              </a:ext>
-            </a:extLst>
-          </a:blip>
-          <a:srcRect/>
-          <a:stretch/>
-        </p:blipFill>
-        <p:spPr>
-          <a:xfrm>
-            <a:off x="6556248" y="3429000"/>
-            <a:ext cx="5084064" cy="2880360"/>
-          </a:xfrm>
-        </p:spPr>
-      </p:pic>
-      <p:sp>
-        <p:nvSpPr>
-          <p:cNvPr id="4" name="Date Placeholder 3">
-            <a:extLst>
-              <a:ext uri="{FF2B5EF4-FFF2-40B4-BE49-F238E27FC236}">
-                <a16:creationId xmlns:a16="http://schemas.microsoft.com/office/drawing/2014/main" id="{7823E305-6365-4345-8BD1-4A31C61D96CB}"/>
-              </a:ext>
-            </a:extLst>
-          </p:cNvPr>
           <p:cNvSpPr>
             <a:spLocks noGrp="1"/>
           </p:cNvSpPr>
           <p:nvPr>
-            <p:ph type="dt" sz="half" idx="10"/>
-          </p:nvPr>
-        </p:nvSpPr>
-        <p:spPr>
-          <a:xfrm>
-            <a:off x="550863" y="6507212"/>
-            <a:ext cx="2628900" cy="153888"/>
-          </a:xfrm>
-        </p:spPr>
+            <p:ph type="sldNum" sz="quarter" idx="12"/>
+          </p:nvPr>
+        </p:nvSpPr>
+        <p:spPr/>
         <p:txBody>
           <a:bodyPr/>
           <a:lstStyle/>
           <a:p>
-            <a:r>
-              <a:rPr lang="en-US"/>
-              <a:t>Tuesday, February 2, 20XX</a:t>
-            </a:r>
-          </a:p>
-        </p:txBody>
-      </p:sp>
-      <p:sp>
-        <p:nvSpPr>
-          <p:cNvPr id="5" name="Footer Placeholder 4">
-            <a:extLst>
-              <a:ext uri="{FF2B5EF4-FFF2-40B4-BE49-F238E27FC236}">
-                <a16:creationId xmlns:a16="http://schemas.microsoft.com/office/drawing/2014/main" id="{0B37A3FF-ED32-4C4A-A21F-848A3BF6F896}"/>
-              </a:ext>
-            </a:extLst>
-          </p:cNvPr>
-          <p:cNvSpPr>
-            <a:spLocks noGrp="1"/>
-          </p:cNvSpPr>
-          <p:nvPr>
-            <p:ph type="ftr" sz="quarter" idx="11"/>
-          </p:nvPr>
-        </p:nvSpPr>
-        <p:spPr>
-          <a:xfrm>
-            <a:off x="3359150" y="6507212"/>
-            <a:ext cx="6379210" cy="153888"/>
-          </a:xfrm>
-        </p:spPr>
-        <p:txBody>
-          <a:bodyPr/>
-          <a:lstStyle/>
-          <a:p>
-            <a:r>
-              <a:rPr lang="en-US"/>
-              <a:t>Sample Footer Text</a:t>
-            </a:r>
-          </a:p>
-        </p:txBody>
-      </p:sp>
-      <p:sp>
-        <p:nvSpPr>
-          <p:cNvPr id="6" name="Slide Number Placeholder 5">
-            <a:extLst>
-              <a:ext uri="{FF2B5EF4-FFF2-40B4-BE49-F238E27FC236}">
-                <a16:creationId xmlns:a16="http://schemas.microsoft.com/office/drawing/2014/main" id="{36E60F23-FB58-4EF8-82FD-E86CED25FDD4}"/>
-              </a:ext>
-            </a:extLst>
-          </p:cNvPr>
-          <p:cNvSpPr>
-            <a:spLocks noGrp="1"/>
-          </p:cNvSpPr>
-          <p:nvPr>
-            <p:ph type="sldNum" sz="quarter" idx="12"/>
-          </p:nvPr>
-        </p:nvSpPr>
-        <p:spPr>
-          <a:xfrm>
-            <a:off x="9948863" y="6507212"/>
-            <a:ext cx="1692274" cy="153888"/>
-          </a:xfrm>
-        </p:spPr>
-        <p:txBody>
-          <a:bodyPr/>
-          <a:lstStyle/>
-          <a:p>
             <a:fld id="{DBA1B0FB-D917-4C8C-928F-313BD683BF39}" type="slidenum">
               <a:rPr lang="en-US" smtClean="0"/>
-              <a:pPr/>
               <a:t>19</a:t>
             </a:fld>
             <a:endParaRPr lang="en-US"/>
@@ -20155,7 +20216,7 @@
     </p:spTree>
     <p:extLst>
       <p:ext uri="{BB962C8B-B14F-4D97-AF65-F5344CB8AC3E}">
-        <p14:creationId xmlns:p14="http://schemas.microsoft.com/office/powerpoint/2010/main" val="3247798845"/>
+        <p14:creationId xmlns:p14="http://schemas.microsoft.com/office/powerpoint/2010/main" val="4124815862"/>
       </p:ext>
     </p:extLst>
   </p:cSld>
@@ -20460,6 +20521,217 @@
     <p:extLst>
       <p:ext uri="{BB962C8B-B14F-4D97-AF65-F5344CB8AC3E}">
         <p14:creationId xmlns:p14="http://schemas.microsoft.com/office/powerpoint/2010/main" val="2313234867"/>
+      </p:ext>
+    </p:extLst>
+  </p:cSld>
+  <p:clrMapOvr>
+    <a:masterClrMapping/>
+  </p:clrMapOvr>
+</p:sld>
+</file>
+
+<file path=ppt/slides/slide20.xml><?xml version="1.0" encoding="utf-8"?>
+<p:sld xmlns:a="http://schemas.openxmlformats.org/drawingml/2006/main" xmlns:r="http://schemas.openxmlformats.org/officeDocument/2006/relationships" xmlns:p="http://schemas.openxmlformats.org/presentationml/2006/main">
+  <p:cSld>
+    <p:spTree>
+      <p:nvGrpSpPr>
+        <p:cNvPr id="1" name=""/>
+        <p:cNvGrpSpPr/>
+        <p:nvPr/>
+      </p:nvGrpSpPr>
+      <p:grpSpPr>
+        <a:xfrm>
+          <a:off x="0" y="0"/>
+          <a:ext cx="0" cy="0"/>
+          <a:chOff x="0" y="0"/>
+          <a:chExt cx="0" cy="0"/>
+        </a:xfrm>
+      </p:grpSpPr>
+      <p:sp>
+        <p:nvSpPr>
+          <p:cNvPr id="22" name="Title 21">
+            <a:extLst>
+              <a:ext uri="{FF2B5EF4-FFF2-40B4-BE49-F238E27FC236}">
+                <a16:creationId xmlns:a16="http://schemas.microsoft.com/office/drawing/2014/main" id="{F8FAEED9-1ECD-45F9-87A0-9394BAEABB79}"/>
+              </a:ext>
+            </a:extLst>
+          </p:cNvPr>
+          <p:cNvSpPr>
+            <a:spLocks noGrp="1"/>
+          </p:cNvSpPr>
+          <p:nvPr>
+            <p:ph type="ctrTitle"/>
+          </p:nvPr>
+        </p:nvSpPr>
+        <p:spPr>
+          <a:xfrm>
+            <a:off x="550863" y="549275"/>
+            <a:ext cx="5437187" cy="2986234"/>
+          </a:xfrm>
+        </p:spPr>
+        <p:txBody>
+          <a:bodyPr/>
+          <a:lstStyle/>
+          <a:p>
+            <a:r>
+              <a:rPr lang="en-US" dirty="0"/>
+              <a:t>Thank You</a:t>
+            </a:r>
+          </a:p>
+        </p:txBody>
+      </p:sp>
+      <p:sp>
+        <p:nvSpPr>
+          <p:cNvPr id="23" name="Subtitle 22">
+            <a:extLst>
+              <a:ext uri="{FF2B5EF4-FFF2-40B4-BE49-F238E27FC236}">
+                <a16:creationId xmlns:a16="http://schemas.microsoft.com/office/drawing/2014/main" id="{8E5E4638-9BCB-4C2E-914F-CC868E2020D5}"/>
+              </a:ext>
+            </a:extLst>
+          </p:cNvPr>
+          <p:cNvSpPr>
+            <a:spLocks noGrp="1"/>
+          </p:cNvSpPr>
+          <p:nvPr>
+            <p:ph type="subTitle" idx="1"/>
+          </p:nvPr>
+        </p:nvSpPr>
+        <p:spPr>
+          <a:xfrm>
+            <a:off x="550863" y="3827610"/>
+            <a:ext cx="5437187" cy="2265216"/>
+          </a:xfrm>
+        </p:spPr>
+        <p:txBody>
+          <a:bodyPr/>
+          <a:lstStyle/>
+          <a:p>
+            <a:r>
+              <a:rPr lang="en-US" dirty="0"/>
+              <a:t>Jason Fedler</a:t>
+            </a:r>
+          </a:p>
+          <a:p>
+            <a:r>
+              <a:rPr lang="en-US" dirty="0"/>
+              <a:t>Cary Office</a:t>
+            </a:r>
+          </a:p>
+          <a:p>
+            <a:r>
+              <a:rPr lang="en-US" dirty="0"/>
+              <a:t>SRE Team</a:t>
+            </a:r>
+          </a:p>
+        </p:txBody>
+      </p:sp>
+      <p:pic>
+        <p:nvPicPr>
+          <p:cNvPr id="27" name="Picture Placeholder 26" descr="Data Points Digital background">
+            <a:extLst>
+              <a:ext uri="{FF2B5EF4-FFF2-40B4-BE49-F238E27FC236}">
+                <a16:creationId xmlns:a16="http://schemas.microsoft.com/office/drawing/2014/main" id="{9E660784-34E2-4CDA-926A-DDD6AAF35046}"/>
+              </a:ext>
+            </a:extLst>
+          </p:cNvPr>
+          <p:cNvPicPr>
+            <a:picLocks noGrp="1" noChangeAspect="1"/>
+          </p:cNvPicPr>
+          <p:nvPr>
+            <p:ph type="pic" sz="quarter" idx="15"/>
+          </p:nvPr>
+        </p:nvPicPr>
+        <p:blipFill rotWithShape="1">
+          <a:blip r:embed="rId2" cstate="screen">
+            <a:extLst>
+              <a:ext uri="{28A0092B-C50C-407E-A947-70E740481C1C}">
+                <a14:useLocalDpi xmlns:a14="http://schemas.microsoft.com/office/drawing/2010/main" val="0"/>
+              </a:ext>
+            </a:extLst>
+          </a:blip>
+          <a:srcRect/>
+          <a:stretch/>
+        </p:blipFill>
+        <p:spPr>
+          <a:xfrm>
+            <a:off x="6556248" y="548640"/>
+            <a:ext cx="5084064" cy="2880360"/>
+          </a:xfrm>
+        </p:spPr>
+      </p:pic>
+      <p:pic>
+        <p:nvPicPr>
+          <p:cNvPr id="33" name="Picture Placeholder 32" descr="Data Points Digital background">
+            <a:extLst>
+              <a:ext uri="{FF2B5EF4-FFF2-40B4-BE49-F238E27FC236}">
+                <a16:creationId xmlns:a16="http://schemas.microsoft.com/office/drawing/2014/main" id="{48106962-23C6-4DFE-BB3A-E5FFF03F38CE}"/>
+              </a:ext>
+            </a:extLst>
+          </p:cNvPr>
+          <p:cNvPicPr>
+            <a:picLocks noGrp="1" noChangeAspect="1"/>
+          </p:cNvPicPr>
+          <p:nvPr>
+            <p:ph type="pic" sz="quarter" idx="16"/>
+          </p:nvPr>
+        </p:nvPicPr>
+        <p:blipFill rotWithShape="1">
+          <a:blip r:embed="rId3" cstate="screen">
+            <a:extLst>
+              <a:ext uri="{28A0092B-C50C-407E-A947-70E740481C1C}">
+                <a14:useLocalDpi xmlns:a14="http://schemas.microsoft.com/office/drawing/2010/main" val="0"/>
+              </a:ext>
+            </a:extLst>
+          </a:blip>
+          <a:srcRect/>
+          <a:stretch/>
+        </p:blipFill>
+        <p:spPr>
+          <a:xfrm>
+            <a:off x="6556248" y="3429000"/>
+            <a:ext cx="5084064" cy="2880360"/>
+          </a:xfrm>
+        </p:spPr>
+      </p:pic>
+      <p:sp>
+        <p:nvSpPr>
+          <p:cNvPr id="6" name="Slide Number Placeholder 5">
+            <a:extLst>
+              <a:ext uri="{FF2B5EF4-FFF2-40B4-BE49-F238E27FC236}">
+                <a16:creationId xmlns:a16="http://schemas.microsoft.com/office/drawing/2014/main" id="{36E60F23-FB58-4EF8-82FD-E86CED25FDD4}"/>
+              </a:ext>
+            </a:extLst>
+          </p:cNvPr>
+          <p:cNvSpPr>
+            <a:spLocks noGrp="1"/>
+          </p:cNvSpPr>
+          <p:nvPr>
+            <p:ph type="sldNum" sz="quarter" idx="12"/>
+          </p:nvPr>
+        </p:nvSpPr>
+        <p:spPr>
+          <a:xfrm>
+            <a:off x="9948863" y="6507212"/>
+            <a:ext cx="1692274" cy="153888"/>
+          </a:xfrm>
+        </p:spPr>
+        <p:txBody>
+          <a:bodyPr/>
+          <a:lstStyle/>
+          <a:p>
+            <a:fld id="{DBA1B0FB-D917-4C8C-928F-313BD683BF39}" type="slidenum">
+              <a:rPr lang="en-US" smtClean="0"/>
+              <a:pPr/>
+              <a:t>20</a:t>
+            </a:fld>
+            <a:endParaRPr lang="en-US"/>
+          </a:p>
+        </p:txBody>
+      </p:sp>
+    </p:spTree>
+    <p:extLst>
+      <p:ext uri="{BB962C8B-B14F-4D97-AF65-F5344CB8AC3E}">
+        <p14:creationId xmlns:p14="http://schemas.microsoft.com/office/powerpoint/2010/main" val="3247798845"/>
       </p:ext>
     </p:extLst>
   </p:cSld>
@@ -22400,7 +22672,7 @@
         <p:spPr>
           <a:xfrm>
             <a:off x="550863" y="1833151"/>
-            <a:ext cx="5429114" cy="4413825"/>
+            <a:ext cx="5429114" cy="2179291"/>
           </a:xfrm>
         </p:spPr>
         <p:txBody>
@@ -22439,28 +22711,6 @@
               <a:defRPr sz="2000"/>
             </a:pPr>
             <a:endParaRPr lang="en-US" dirty="0"/>
-          </a:p>
-          <a:p>
-            <a:pPr marL="0" indent="0">
-              <a:buNone/>
-              <a:defRPr sz="2000"/>
-            </a:pPr>
-            <a:r>
-              <a:rPr lang="en-US" dirty="0"/>
-              <a:t>A </a:t>
-            </a:r>
-            <a:r>
-              <a:rPr lang="en-US" i="1" dirty="0"/>
-              <a:t>unit test</a:t>
-            </a:r>
-            <a:r>
-              <a:rPr lang="en-US" dirty="0"/>
-              <a:t> is a piece of code (usually a method) that invokes another piece of code and checks the correctness of some assumptions afterward. If the assumptions turn out to be wrong, the unit test has failed. A “unit” is a method or function. ~ </a:t>
-            </a:r>
-            <a:r>
-              <a:rPr lang="en-US" i="1" dirty="0"/>
-              <a:t>The Art of Unit Testing, p. 4</a:t>
-            </a:r>
           </a:p>
         </p:txBody>
       </p:sp>
@@ -22515,8 +22765,8 @@
         </p:nvSpPr>
         <p:spPr>
           <a:xfrm>
-            <a:off x="6212023" y="1833151"/>
-            <a:ext cx="5436391" cy="4413825"/>
+            <a:off x="6212023" y="1833152"/>
+            <a:ext cx="5436391" cy="2179290"/>
           </a:xfrm>
         </p:spPr>
         <p:txBody>
@@ -22744,6 +22994,57 @@
           <a:p>
             <a:pPr algn="ctr"/>
             <a:endParaRPr lang="en-US"/>
+          </a:p>
+        </p:txBody>
+      </p:sp>
+      <p:sp>
+        <p:nvSpPr>
+          <p:cNvPr id="2" name="TextBox 1">
+            <a:extLst>
+              <a:ext uri="{FF2B5EF4-FFF2-40B4-BE49-F238E27FC236}">
+                <a16:creationId xmlns:a16="http://schemas.microsoft.com/office/drawing/2014/main" id="{91F7BB18-50D8-D152-18A5-3F8C9EACF243}"/>
+              </a:ext>
+            </a:extLst>
+          </p:cNvPr>
+          <p:cNvSpPr txBox="1"/>
+          <p:nvPr/>
+        </p:nvSpPr>
+        <p:spPr>
+          <a:xfrm>
+            <a:off x="625422" y="4450948"/>
+            <a:ext cx="10941156" cy="1015663"/>
+          </a:xfrm>
+          <a:prstGeom prst="rect">
+            <a:avLst/>
+          </a:prstGeom>
+          <a:noFill/>
+        </p:spPr>
+        <p:txBody>
+          <a:bodyPr wrap="square" rtlCol="0">
+            <a:spAutoFit/>
+          </a:bodyPr>
+          <a:lstStyle/>
+          <a:p>
+            <a:pPr marL="0" indent="0">
+              <a:buNone/>
+              <a:defRPr sz="2000"/>
+            </a:pPr>
+            <a:r>
+              <a:rPr lang="en-US" dirty="0"/>
+              <a:t>A </a:t>
+            </a:r>
+            <a:r>
+              <a:rPr lang="en-US" i="1" dirty="0"/>
+              <a:t>unit test</a:t>
+            </a:r>
+            <a:r>
+              <a:rPr lang="en-US" dirty="0"/>
+              <a:t> is a piece of code (usually a method) that invokes another piece of code and checks the correctness of some assumptions afterward. If the assumptions turn out to be wrong, the unit test has failed. A “unit” is a method or function. ~ </a:t>
+            </a:r>
+            <a:r>
+              <a:rPr lang="en-US" i="1" dirty="0"/>
+              <a:t>The Art of Unit Testing, p. 4</a:t>
+            </a:r>
           </a:p>
         </p:txBody>
       </p:sp>
@@ -24407,6 +24708,15 @@
             <a:r>
               <a:rPr lang="en-US" dirty="0"/>
               <a:t>How to structure unit tests</a:t>
+            </a:r>
+          </a:p>
+          <a:p>
+            <a:pPr>
+              <a:defRPr sz="2000"/>
+            </a:pPr>
+            <a:r>
+              <a:rPr lang="en-US" dirty="0"/>
+              <a:t>How to name unit tests</a:t>
             </a:r>
           </a:p>
           <a:p>
@@ -27420,25 +27730,6 @@
 </file>
 
 <file path=customXml/item1.xml><?xml version="1.0" encoding="utf-8"?>
-<p:properties xmlns:p="http://schemas.microsoft.com/office/2006/metadata/properties" xmlns:xsi="http://www.w3.org/2001/XMLSchema-instance" xmlns:pc="http://schemas.microsoft.com/office/infopath/2007/PartnerControls">
-  <documentManagement>
-    <_ip_UnifiedCompliancePolicyUIAction xmlns="http://schemas.microsoft.com/sharepoint/v3" xsi:nil="true"/>
-    <Image xmlns="71af3243-3dd4-4a8d-8c0d-dd76da1f02a5">
-      <Url xsi:nil="true"/>
-      <Description xsi:nil="true"/>
-    </Image>
-    <Status xmlns="71af3243-3dd4-4a8d-8c0d-dd76da1f02a5">Not started</Status>
-    <_ip_UnifiedCompliancePolicyProperties xmlns="http://schemas.microsoft.com/sharepoint/v3" xsi:nil="true"/>
-    <lcf76f155ced4ddcb4097134ff3c332f xmlns="71af3243-3dd4-4a8d-8c0d-dd76da1f02a5">
-      <Terms xmlns="http://schemas.microsoft.com/office/infopath/2007/PartnerControls"/>
-    </lcf76f155ced4ddcb4097134ff3c332f>
-    <TaxCatchAll xmlns="230e9df3-be65-4c73-a93b-d1236ebd677e"/>
-    <MediaServiceKeyPoints xmlns="71af3243-3dd4-4a8d-8c0d-dd76da1f02a5" xsi:nil="true"/>
-  </documentManagement>
-</p:properties>
-</file>
-
-<file path=customXml/item2.xml><?xml version="1.0" encoding="utf-8"?>
 <ct:contentTypeSchema xmlns:ct="http://schemas.microsoft.com/office/2006/metadata/contentType" xmlns:ma="http://schemas.microsoft.com/office/2006/metadata/properties/metaAttributes" ct:_="" ma:_="" ma:contentTypeName="Document" ma:contentTypeID="0x01010079F111ED35F8CC479449609E8A0923A6" ma:contentTypeVersion="18" ma:contentTypeDescription="Create a new document." ma:contentTypeScope="" ma:versionID="22a266b9fa9a230c5a512669d8b298c3">
   <xsd:schema xmlns:xsd="http://www.w3.org/2001/XMLSchema" xmlns:xs="http://www.w3.org/2001/XMLSchema" xmlns:p="http://schemas.microsoft.com/office/2006/metadata/properties" xmlns:ns1="http://schemas.microsoft.com/sharepoint/v3" xmlns:ns2="71af3243-3dd4-4a8d-8c0d-dd76da1f02a5" xmlns:ns3="16c05727-aa75-4e4a-9b5f-8a80a1165891" xmlns:ns4="230e9df3-be65-4c73-a93b-d1236ebd677e" targetNamespace="http://schemas.microsoft.com/office/2006/metadata/properties" ma:root="true" ma:fieldsID="eddc33fff6b14141ee5c74a0d29ea6a1" ns1:_="" ns2:_="" ns3:_="" ns4:_="">
     <xsd:import namespace="http://schemas.microsoft.com/sharepoint/v3"/>
@@ -27714,6 +28005,25 @@
 </ct:contentTypeSchema>
 </file>
 
+<file path=customXml/item2.xml><?xml version="1.0" encoding="utf-8"?>
+<p:properties xmlns:p="http://schemas.microsoft.com/office/2006/metadata/properties" xmlns:xsi="http://www.w3.org/2001/XMLSchema-instance" xmlns:pc="http://schemas.microsoft.com/office/infopath/2007/PartnerControls">
+  <documentManagement>
+    <_ip_UnifiedCompliancePolicyUIAction xmlns="http://schemas.microsoft.com/sharepoint/v3" xsi:nil="true"/>
+    <Image xmlns="71af3243-3dd4-4a8d-8c0d-dd76da1f02a5">
+      <Url xsi:nil="true"/>
+      <Description xsi:nil="true"/>
+    </Image>
+    <Status xmlns="71af3243-3dd4-4a8d-8c0d-dd76da1f02a5">Not started</Status>
+    <_ip_UnifiedCompliancePolicyProperties xmlns="http://schemas.microsoft.com/sharepoint/v3" xsi:nil="true"/>
+    <lcf76f155ced4ddcb4097134ff3c332f xmlns="71af3243-3dd4-4a8d-8c0d-dd76da1f02a5">
+      <Terms xmlns="http://schemas.microsoft.com/office/infopath/2007/PartnerControls"/>
+    </lcf76f155ced4ddcb4097134ff3c332f>
+    <TaxCatchAll xmlns="230e9df3-be65-4c73-a93b-d1236ebd677e"/>
+    <MediaServiceKeyPoints xmlns="71af3243-3dd4-4a8d-8c0d-dd76da1f02a5" xsi:nil="true"/>
+  </documentManagement>
+</p:properties>
+</file>
+
 <file path=customXml/item3.xml><?xml version="1.0" encoding="utf-8"?>
 <?mso-contentType ?>
 <FormTemplates xmlns="http://schemas.microsoft.com/sharepoint/v3/contenttype/forms">
@@ -27724,18 +28034,6 @@
 </file>
 
 <file path=customXml/itemProps1.xml><?xml version="1.0" encoding="utf-8"?>
-<ds:datastoreItem xmlns:ds="http://schemas.openxmlformats.org/officeDocument/2006/customXml" ds:itemID="{50811A92-D464-4AC4-A396-BA73B10CEEAC}">
-  <ds:schemaRefs>
-    <ds:schemaRef ds:uri="http://schemas.microsoft.com/office/2006/metadata/properties"/>
-    <ds:schemaRef ds:uri="http://schemas.microsoft.com/office/infopath/2007/PartnerControls"/>
-    <ds:schemaRef ds:uri="http://schemas.microsoft.com/sharepoint/v3"/>
-    <ds:schemaRef ds:uri="71af3243-3dd4-4a8d-8c0d-dd76da1f02a5"/>
-    <ds:schemaRef ds:uri="230e9df3-be65-4c73-a93b-d1236ebd677e"/>
-  </ds:schemaRefs>
-</ds:datastoreItem>
-</file>
-
-<file path=customXml/itemProps2.xml><?xml version="1.0" encoding="utf-8"?>
 <ds:datastoreItem xmlns:ds="http://schemas.openxmlformats.org/officeDocument/2006/customXml" ds:itemID="{DE4876F9-7AE1-498D-B8FE-1E3AD703D2AF}">
   <ds:schemaRefs>
     <ds:schemaRef ds:uri="http://schemas.microsoft.com/office/2006/metadata/contentType"/>
@@ -27756,6 +28054,18 @@
 </ds:datastoreItem>
 </file>
 
+<file path=customXml/itemProps2.xml><?xml version="1.0" encoding="utf-8"?>
+<ds:datastoreItem xmlns:ds="http://schemas.openxmlformats.org/officeDocument/2006/customXml" ds:itemID="{50811A92-D464-4AC4-A396-BA73B10CEEAC}">
+  <ds:schemaRefs>
+    <ds:schemaRef ds:uri="http://schemas.microsoft.com/office/2006/metadata/properties"/>
+    <ds:schemaRef ds:uri="http://schemas.microsoft.com/office/infopath/2007/PartnerControls"/>
+    <ds:schemaRef ds:uri="http://schemas.microsoft.com/sharepoint/v3"/>
+    <ds:schemaRef ds:uri="71af3243-3dd4-4a8d-8c0d-dd76da1f02a5"/>
+    <ds:schemaRef ds:uri="230e9df3-be65-4c73-a93b-d1236ebd677e"/>
+  </ds:schemaRefs>
+</ds:datastoreItem>
+</file>
+
 <file path=customXml/itemProps3.xml><?xml version="1.0" encoding="utf-8"?>
 <ds:datastoreItem xmlns:ds="http://schemas.openxmlformats.org/officeDocument/2006/customXml" ds:itemID="{904751AB-E840-446F-8D49-E697067EC887}">
   <ds:schemaRefs>

</xml_diff>

<commit_message>
makes minor updates to a few slides;
Change-Id: Ie62c92a22104f0842ec969d32f20c8a46e8d6088
</commit_message>
<xml_diff>
--- a/PowerPoint/UnitTestingInCSharp.pptx
+++ b/PowerPoint/UnitTestingInCSharp.pptx
@@ -245,7 +245,7 @@
           <a:p>
             <a:fld id="{C17F2C1D-F243-42AB-ADF2-E7CB4E04900E}" type="datetimeFigureOut">
               <a:rPr lang="en-US" smtClean="0"/>
-              <a:t>11/22/22</a:t>
+              <a:t>Mon 28-Nov-2022</a:t>
             </a:fld>
             <a:endParaRPr lang="en-US"/>
           </a:p>
@@ -422,7 +422,7 @@
           <a:p>
             <a:fld id="{020CE34E-5667-4A32-A6BA-10C7A552BC63}" type="datetimeFigureOut">
               <a:rPr lang="en-US" smtClean="0"/>
-              <a:t>11/22/22</a:t>
+              <a:t>Mon 28-Nov-2022</a:t>
             </a:fld>
             <a:endParaRPr lang="en-US"/>
           </a:p>
@@ -15364,11 +15364,14 @@
               </a:lnSpc>
               <a:buNone/>
             </a:pPr>
-            <a:endParaRPr lang="en-US" kern="1200" dirty="0">
-              <a:latin typeface="+mn-lt"/>
-              <a:ea typeface="+mn-ea"/>
-              <a:cs typeface="+mn-cs"/>
-            </a:endParaRPr>
+            <a:r>
+              <a:rPr lang="en-US" kern="1200" dirty="0">
+                <a:latin typeface="+mn-lt"/>
+                <a:ea typeface="+mn-ea"/>
+                <a:cs typeface="+mn-cs"/>
+              </a:rPr>
+              <a:t>What makes up a (good) unit test?</a:t>
+            </a:r>
           </a:p>
         </p:txBody>
       </p:sp>
@@ -15789,7 +15792,7 @@
           <a:p>
             <a:r>
               <a:rPr lang="en-US" dirty="0"/>
-              <a:t>Characteristics of Unit Tests</a:t>
+              <a:t>Characteristics and Benefits</a:t>
             </a:r>
           </a:p>
         </p:txBody>
@@ -18025,11 +18028,14 @@
               </a:lnSpc>
               <a:buNone/>
             </a:pPr>
-            <a:endParaRPr lang="en-US" kern="1200" dirty="0">
-              <a:latin typeface="+mn-lt"/>
-              <a:ea typeface="+mn-ea"/>
-              <a:cs typeface="+mn-cs"/>
-            </a:endParaRPr>
+            <a:r>
+              <a:rPr lang="en-US" kern="1200" dirty="0">
+                <a:latin typeface="+mn-lt"/>
+                <a:ea typeface="+mn-ea"/>
+                <a:cs typeface="+mn-cs"/>
+              </a:rPr>
+              <a:t>Hint: don’t test all the things</a:t>
+            </a:r>
           </a:p>
         </p:txBody>
       </p:sp>
@@ -18923,11 +18929,14 @@
               </a:lnSpc>
               <a:buNone/>
             </a:pPr>
-            <a:endParaRPr lang="en-US" kern="1200" dirty="0">
-              <a:latin typeface="+mn-lt"/>
-              <a:ea typeface="+mn-ea"/>
-              <a:cs typeface="+mn-cs"/>
-            </a:endParaRPr>
+            <a:r>
+              <a:rPr lang="en-US" kern="1200" dirty="0">
+                <a:latin typeface="+mn-lt"/>
+                <a:ea typeface="+mn-ea"/>
+                <a:cs typeface="+mn-cs"/>
+              </a:rPr>
+              <a:t>Code coverage is a metric of how well unit tests exercise production code, but it is not a be-all, end-all metric.</a:t>
+            </a:r>
           </a:p>
         </p:txBody>
       </p:sp>
@@ -19900,7 +19909,7 @@
           <a:p>
             <a:r>
               <a:rPr lang="en-US" dirty="0"/>
-              <a:t>Unit tests are another tool in our collective toolbelt that can help us write better code that maintains the validity of the codebase, but it takes time and effort – and art – to do it properly.</a:t>
+              <a:t>Unit tests are another tool in our collective toolbelt that can help us write better code and maintain the validity of the codebase, but it takes time and effort – and art – to do it properly.</a:t>
             </a:r>
           </a:p>
         </p:txBody>
@@ -20137,6 +20146,31 @@
               </a:rPr>
               <a:t> </a:t>
             </a:r>
+          </a:p>
+          <a:p>
+            <a:pPr lvl="1"/>
+            <a:r>
+              <a:rPr lang="en-US" dirty="0">
+                <a:solidFill>
+                  <a:srgbClr val="D4D4D4"/>
+                </a:solidFill>
+              </a:rPr>
+              <a:t>This book has changed the way I think about unit testing for </a:t>
+            </a:r>
+            <a:r>
+              <a:rPr lang="en-US">
+                <a:solidFill>
+                  <a:srgbClr val="D4D4D4"/>
+                </a:solidFill>
+              </a:rPr>
+              <a:t>the better</a:t>
+            </a:r>
+            <a:endParaRPr lang="en-US" b="0" dirty="0">
+              <a:solidFill>
+                <a:srgbClr val="D4D4D4"/>
+              </a:solidFill>
+              <a:effectLst/>
+            </a:endParaRPr>
           </a:p>
           <a:p>
             <a:r>
@@ -22190,11 +22224,14 @@
               </a:lnSpc>
               <a:buNone/>
             </a:pPr>
-            <a:endParaRPr lang="en-US" kern="1200" dirty="0">
-              <a:latin typeface="+mn-lt"/>
-              <a:ea typeface="+mn-ea"/>
-              <a:cs typeface="+mn-cs"/>
-            </a:endParaRPr>
+            <a:r>
+              <a:rPr lang="en-US" kern="1200" dirty="0">
+                <a:latin typeface="+mn-lt"/>
+                <a:ea typeface="+mn-ea"/>
+                <a:cs typeface="+mn-cs"/>
+              </a:rPr>
+              <a:t>Unit testing is not a panacea for better code</a:t>
+            </a:r>
           </a:p>
         </p:txBody>
       </p:sp>
@@ -22615,7 +22652,7 @@
           <a:p>
             <a:r>
               <a:rPr lang="en-US" dirty="0"/>
-              <a:t>Unit Testing</a:t>
+              <a:t>What is Unit Testing?</a:t>
             </a:r>
           </a:p>
         </p:txBody>
@@ -24237,11 +24274,14 @@
               </a:lnSpc>
               <a:buNone/>
             </a:pPr>
-            <a:endParaRPr lang="en-US" kern="1200" dirty="0">
-              <a:latin typeface="+mn-lt"/>
-              <a:ea typeface="+mn-ea"/>
-              <a:cs typeface="+mn-cs"/>
-            </a:endParaRPr>
+            <a:r>
+              <a:rPr lang="en-US" kern="1200" dirty="0">
+                <a:latin typeface="+mn-lt"/>
+                <a:ea typeface="+mn-ea"/>
+                <a:cs typeface="+mn-cs"/>
+              </a:rPr>
+              <a:t>There is a lot to the subject of unit testing, and this is a very basic introduction.</a:t>
+            </a:r>
           </a:p>
         </p:txBody>
       </p:sp>
@@ -24736,6 +24776,13 @@
               <a:rPr lang="en-US" dirty="0"/>
               <a:t>Examples of how to do any of the above</a:t>
             </a:r>
+          </a:p>
+          <a:p>
+            <a:pPr marL="0" indent="0">
+              <a:buNone/>
+              <a:defRPr sz="2000"/>
+            </a:pPr>
+            <a:endParaRPr lang="en-US" dirty="0"/>
           </a:p>
         </p:txBody>
       </p:sp>
@@ -26145,11 +26192,14 @@
               </a:lnSpc>
               <a:buNone/>
             </a:pPr>
-            <a:endParaRPr lang="en-US" kern="1200" dirty="0">
-              <a:latin typeface="+mn-lt"/>
-              <a:ea typeface="+mn-ea"/>
-              <a:cs typeface="+mn-cs"/>
-            </a:endParaRPr>
+            <a:r>
+              <a:rPr lang="en-US" kern="1200" dirty="0">
+                <a:latin typeface="+mn-lt"/>
+                <a:ea typeface="+mn-ea"/>
+                <a:cs typeface="+mn-cs"/>
+              </a:rPr>
+              <a:t>It is good to have goals</a:t>
+            </a:r>
           </a:p>
         </p:txBody>
       </p:sp>
@@ -26570,7 +26620,7 @@
           <a:p>
             <a:r>
               <a:rPr lang="en-US" dirty="0"/>
-              <a:t>Unit Testing</a:t>
+              <a:t>Goals of Unit Testing</a:t>
             </a:r>
           </a:p>
         </p:txBody>
@@ -28006,6 +28056,15 @@
 </file>
 
 <file path=customXml/item2.xml><?xml version="1.0" encoding="utf-8"?>
+<?mso-contentType ?>
+<FormTemplates xmlns="http://schemas.microsoft.com/sharepoint/v3/contenttype/forms">
+  <Display>DocumentLibraryForm</Display>
+  <Edit>DocumentLibraryForm</Edit>
+  <New>DocumentLibraryForm</New>
+</FormTemplates>
+</file>
+
+<file path=customXml/item3.xml><?xml version="1.0" encoding="utf-8"?>
 <p:properties xmlns:p="http://schemas.microsoft.com/office/2006/metadata/properties" xmlns:xsi="http://www.w3.org/2001/XMLSchema-instance" xmlns:pc="http://schemas.microsoft.com/office/infopath/2007/PartnerControls">
   <documentManagement>
     <_ip_UnifiedCompliancePolicyUIAction xmlns="http://schemas.microsoft.com/sharepoint/v3" xsi:nil="true"/>
@@ -28022,15 +28081,6 @@
     <MediaServiceKeyPoints xmlns="71af3243-3dd4-4a8d-8c0d-dd76da1f02a5" xsi:nil="true"/>
   </documentManagement>
 </p:properties>
-</file>
-
-<file path=customXml/item3.xml><?xml version="1.0" encoding="utf-8"?>
-<?mso-contentType ?>
-<FormTemplates xmlns="http://schemas.microsoft.com/sharepoint/v3/contenttype/forms">
-  <Display>DocumentLibraryForm</Display>
-  <Edit>DocumentLibraryForm</Edit>
-  <New>DocumentLibraryForm</New>
-</FormTemplates>
 </file>
 
 <file path=customXml/itemProps1.xml><?xml version="1.0" encoding="utf-8"?>
@@ -28055,21 +28105,28 @@
 </file>
 
 <file path=customXml/itemProps2.xml><?xml version="1.0" encoding="utf-8"?>
-<ds:datastoreItem xmlns:ds="http://schemas.openxmlformats.org/officeDocument/2006/customXml" ds:itemID="{50811A92-D464-4AC4-A396-BA73B10CEEAC}">
+<ds:datastoreItem xmlns:ds="http://schemas.openxmlformats.org/officeDocument/2006/customXml" ds:itemID="{904751AB-E840-446F-8D49-E697067EC887}">
   <ds:schemaRefs>
-    <ds:schemaRef ds:uri="http://schemas.microsoft.com/office/2006/metadata/properties"/>
-    <ds:schemaRef ds:uri="http://schemas.microsoft.com/office/infopath/2007/PartnerControls"/>
-    <ds:schemaRef ds:uri="http://schemas.microsoft.com/sharepoint/v3"/>
-    <ds:schemaRef ds:uri="71af3243-3dd4-4a8d-8c0d-dd76da1f02a5"/>
-    <ds:schemaRef ds:uri="230e9df3-be65-4c73-a93b-d1236ebd677e"/>
+    <ds:schemaRef ds:uri="http://schemas.microsoft.com/sharepoint/v3/contenttype/forms"/>
   </ds:schemaRefs>
 </ds:datastoreItem>
 </file>
 
 <file path=customXml/itemProps3.xml><?xml version="1.0" encoding="utf-8"?>
-<ds:datastoreItem xmlns:ds="http://schemas.openxmlformats.org/officeDocument/2006/customXml" ds:itemID="{904751AB-E840-446F-8D49-E697067EC887}">
+<ds:datastoreItem xmlns:ds="http://schemas.openxmlformats.org/officeDocument/2006/customXml" ds:itemID="{50811A92-D464-4AC4-A396-BA73B10CEEAC}">
   <ds:schemaRefs>
-    <ds:schemaRef ds:uri="http://schemas.microsoft.com/sharepoint/v3/contenttype/forms"/>
+    <ds:schemaRef ds:uri="71af3243-3dd4-4a8d-8c0d-dd76da1f02a5"/>
+    <ds:schemaRef ds:uri="http://purl.org/dc/terms/"/>
+    <ds:schemaRef ds:uri="http://schemas.microsoft.com/sharepoint/v3"/>
+    <ds:schemaRef ds:uri="230e9df3-be65-4c73-a93b-d1236ebd677e"/>
+    <ds:schemaRef ds:uri="http://purl.org/dc/dcmitype/"/>
+    <ds:schemaRef ds:uri="http://schemas.openxmlformats.org/package/2006/metadata/core-properties"/>
+    <ds:schemaRef ds:uri="16c05727-aa75-4e4a-9b5f-8a80a1165891"/>
+    <ds:schemaRef ds:uri="http://purl.org/dc/elements/1.1/"/>
+    <ds:schemaRef ds:uri="http://schemas.microsoft.com/office/2006/documentManagement/types"/>
+    <ds:schemaRef ds:uri="http://schemas.microsoft.com/office/infopath/2007/PartnerControls"/>
+    <ds:schemaRef ds:uri="http://schemas.microsoft.com/office/2006/metadata/properties"/>
+    <ds:schemaRef ds:uri="http://www.w3.org/XML/1998/namespace"/>
   </ds:schemaRefs>
 </ds:datastoreItem>
 </file>

</xml_diff>

<commit_message>
updates slide title and readme contents;
Change-Id: I2054e601a0eabdda5af1ca3b2e19d38fff003c8b
</commit_message>
<xml_diff>
--- a/PowerPoint/UnitTestingInCSharp.pptx
+++ b/PowerPoint/UnitTestingInCSharp.pptx
@@ -14089,19 +14089,19 @@
         </p:nvSpPr>
         <p:spPr>
           <a:xfrm>
-            <a:off x="7999414" y="1051551"/>
-            <a:ext cx="3565524" cy="2384898"/>
+            <a:off x="7733792" y="1051551"/>
+            <a:ext cx="3966464" cy="2384898"/>
           </a:xfrm>
         </p:spPr>
         <p:txBody>
           <a:bodyPr anchor="b" anchorCtr="0">
-            <a:normAutofit/>
+            <a:normAutofit fontScale="90000"/>
           </a:bodyPr>
           <a:lstStyle/>
           <a:p>
             <a:r>
               <a:rPr lang="en-US" dirty="0"/>
-              <a:t>Unit Testing in C#</a:t>
+              <a:t>An Introduction to Unit Testing in C#</a:t>
             </a:r>
           </a:p>
         </p:txBody>
@@ -28056,15 +28056,6 @@
 </file>
 
 <file path=customXml/item2.xml><?xml version="1.0" encoding="utf-8"?>
-<?mso-contentType ?>
-<FormTemplates xmlns="http://schemas.microsoft.com/sharepoint/v3/contenttype/forms">
-  <Display>DocumentLibraryForm</Display>
-  <Edit>DocumentLibraryForm</Edit>
-  <New>DocumentLibraryForm</New>
-</FormTemplates>
-</file>
-
-<file path=customXml/item3.xml><?xml version="1.0" encoding="utf-8"?>
 <p:properties xmlns:p="http://schemas.microsoft.com/office/2006/metadata/properties" xmlns:xsi="http://www.w3.org/2001/XMLSchema-instance" xmlns:pc="http://schemas.microsoft.com/office/infopath/2007/PartnerControls">
   <documentManagement>
     <_ip_UnifiedCompliancePolicyUIAction xmlns="http://schemas.microsoft.com/sharepoint/v3" xsi:nil="true"/>
@@ -28081,6 +28072,15 @@
     <MediaServiceKeyPoints xmlns="71af3243-3dd4-4a8d-8c0d-dd76da1f02a5" xsi:nil="true"/>
   </documentManagement>
 </p:properties>
+</file>
+
+<file path=customXml/item3.xml><?xml version="1.0" encoding="utf-8"?>
+<?mso-contentType ?>
+<FormTemplates xmlns="http://schemas.microsoft.com/sharepoint/v3/contenttype/forms">
+  <Display>DocumentLibraryForm</Display>
+  <Edit>DocumentLibraryForm</Edit>
+  <New>DocumentLibraryForm</New>
+</FormTemplates>
 </file>
 
 <file path=customXml/itemProps1.xml><?xml version="1.0" encoding="utf-8"?>
@@ -28105,14 +28105,6 @@
 </file>
 
 <file path=customXml/itemProps2.xml><?xml version="1.0" encoding="utf-8"?>
-<ds:datastoreItem xmlns:ds="http://schemas.openxmlformats.org/officeDocument/2006/customXml" ds:itemID="{904751AB-E840-446F-8D49-E697067EC887}">
-  <ds:schemaRefs>
-    <ds:schemaRef ds:uri="http://schemas.microsoft.com/sharepoint/v3/contenttype/forms"/>
-  </ds:schemaRefs>
-</ds:datastoreItem>
-</file>
-
-<file path=customXml/itemProps3.xml><?xml version="1.0" encoding="utf-8"?>
 <ds:datastoreItem xmlns:ds="http://schemas.openxmlformats.org/officeDocument/2006/customXml" ds:itemID="{50811A92-D464-4AC4-A396-BA73B10CEEAC}">
   <ds:schemaRefs>
     <ds:schemaRef ds:uri="71af3243-3dd4-4a8d-8c0d-dd76da1f02a5"/>
@@ -28131,6 +28123,14 @@
 </ds:datastoreItem>
 </file>
 
+<file path=customXml/itemProps3.xml><?xml version="1.0" encoding="utf-8"?>
+<ds:datastoreItem xmlns:ds="http://schemas.openxmlformats.org/officeDocument/2006/customXml" ds:itemID="{904751AB-E840-446F-8D49-E697067EC887}">
+  <ds:schemaRefs>
+    <ds:schemaRef ds:uri="http://schemas.microsoft.com/sharepoint/v3/contenttype/forms"/>
+  </ds:schemaRefs>
+</ds:datastoreItem>
+</file>
+
 <file path=docMetadata/LabelInfo.xml><?xml version="1.0" encoding="utf-8"?>
 <clbl:labelList xmlns:clbl="http://schemas.microsoft.com/office/2020/mipLabelMetadata">
   <clbl:label id="{f42aa342-8706-4288-bd11-ebb85995028c}" enabled="1" method="Standard" siteId="{72f988bf-86f1-41af-91ab-2d7cd011db47}" contentBits="0" removed="0"/>

</xml_diff>

<commit_message>
minor tweaks to some slides; adds John Gass presentation link;
Change-Id: I1a71923c5c0c4c1dab5cd141142a4cd71fe2a265
</commit_message>
<xml_diff>
--- a/PowerPoint/UnitTestingInCSharp.pptx
+++ b/PowerPoint/UnitTestingInCSharp.pptx
@@ -14090,18 +14090,18 @@
         <p:spPr>
           <a:xfrm>
             <a:off x="7733792" y="1051551"/>
-            <a:ext cx="3966464" cy="2384898"/>
+            <a:ext cx="4157472" cy="2384898"/>
           </a:xfrm>
         </p:spPr>
         <p:txBody>
           <a:bodyPr anchor="b" anchorCtr="0">
-            <a:normAutofit fontScale="90000"/>
+            <a:normAutofit/>
           </a:bodyPr>
           <a:lstStyle/>
           <a:p>
             <a:r>
-              <a:rPr lang="en-US" dirty="0"/>
-              <a:t>An Introduction to Unit Testing in C#</a:t>
+              <a:rPr lang="en-US" sz="4400" dirty="0"/>
+              <a:t>An Introduction to Unit Testing</a:t>
             </a:r>
           </a:p>
         </p:txBody>
@@ -15302,7 +15302,7 @@
         <p:spPr>
           <a:xfrm>
             <a:off x="550863" y="549275"/>
-            <a:ext cx="5437187" cy="2986234"/>
+            <a:ext cx="6069393" cy="2986234"/>
           </a:xfrm>
         </p:spPr>
         <p:txBody>
@@ -20155,15 +20155,7 @@
                   <a:srgbClr val="D4D4D4"/>
                 </a:solidFill>
               </a:rPr>
-              <a:t>This book has changed the way I think about unit testing for </a:t>
-            </a:r>
-            <a:r>
-              <a:rPr lang="en-US">
-                <a:solidFill>
-                  <a:srgbClr val="D4D4D4"/>
-                </a:solidFill>
-              </a:rPr>
-              <a:t>the better</a:t>
+              <a:t>This book has changed the way I think about unit testing for the better</a:t>
             </a:r>
             <a:endParaRPr lang="en-US" b="0" dirty="0">
               <a:solidFill>
@@ -20200,12 +20192,52 @@
             </a:r>
           </a:p>
           <a:p>
-            <a:endParaRPr lang="en-US" b="0" dirty="0">
-              <a:solidFill>
-                <a:srgbClr val="D4D4D4"/>
-              </a:solidFill>
-              <a:effectLst/>
-            </a:endParaRPr>
+            <a:r>
+              <a:rPr lang="en-US" b="0" dirty="0">
+                <a:solidFill>
+                  <a:srgbClr val="D4D4D4"/>
+                </a:solidFill>
+                <a:effectLst/>
+              </a:rPr>
+              <a:t>John Gass</a:t>
+            </a:r>
+            <a:r>
+              <a:rPr lang="en-US" b="0">
+                <a:solidFill>
+                  <a:srgbClr val="D4D4D4"/>
+                </a:solidFill>
+                <a:effectLst/>
+              </a:rPr>
+              <a:t>’ “Automated Testing” presentation </a:t>
+            </a:r>
+            <a:r>
+              <a:rPr lang="en-US" b="0" dirty="0">
+                <a:solidFill>
+                  <a:srgbClr val="D4D4D4"/>
+                </a:solidFill>
+                <a:effectLst/>
+              </a:rPr>
+              <a:t>in Feb 2022 </a:t>
+            </a:r>
+            <a:r>
+              <a:rPr lang="en-US" b="0" dirty="0">
+                <a:solidFill>
+                  <a:srgbClr val="D4D4D4"/>
+                </a:solidFill>
+                <a:effectLst/>
+                <a:hlinkClick r:id="rId7"/>
+              </a:rPr>
+              <a:t>https://confluence.garmin.com/display/GENINREACH/Yarmouth+Web+-+Fall+Technical+Review+Series</a:t>
+            </a:r>
+            <a:r>
+              <a:rPr lang="en-US" b="0" dirty="0">
+                <a:solidFill>
+                  <a:srgbClr val="D4D4D4"/>
+                </a:solidFill>
+                <a:effectLst/>
+              </a:rPr>
+              <a:t> </a:t>
+            </a:r>
           </a:p>
           <a:p>
             <a:endParaRPr lang="en-US" b="0" dirty="0">
@@ -22209,7 +22241,7 @@
         <p:spPr>
           <a:xfrm>
             <a:off x="550863" y="3827610"/>
-            <a:ext cx="5437187" cy="2265216"/>
+            <a:ext cx="6089713" cy="2265216"/>
           </a:xfrm>
         </p:spPr>
         <p:txBody>
@@ -28056,6 +28088,15 @@
 </file>
 
 <file path=customXml/item2.xml><?xml version="1.0" encoding="utf-8"?>
+<?mso-contentType ?>
+<FormTemplates xmlns="http://schemas.microsoft.com/sharepoint/v3/contenttype/forms">
+  <Display>DocumentLibraryForm</Display>
+  <Edit>DocumentLibraryForm</Edit>
+  <New>DocumentLibraryForm</New>
+</FormTemplates>
+</file>
+
+<file path=customXml/item3.xml><?xml version="1.0" encoding="utf-8"?>
 <p:properties xmlns:p="http://schemas.microsoft.com/office/2006/metadata/properties" xmlns:xsi="http://www.w3.org/2001/XMLSchema-instance" xmlns:pc="http://schemas.microsoft.com/office/infopath/2007/PartnerControls">
   <documentManagement>
     <_ip_UnifiedCompliancePolicyUIAction xmlns="http://schemas.microsoft.com/sharepoint/v3" xsi:nil="true"/>
@@ -28072,15 +28113,6 @@
     <MediaServiceKeyPoints xmlns="71af3243-3dd4-4a8d-8c0d-dd76da1f02a5" xsi:nil="true"/>
   </documentManagement>
 </p:properties>
-</file>
-
-<file path=customXml/item3.xml><?xml version="1.0" encoding="utf-8"?>
-<?mso-contentType ?>
-<FormTemplates xmlns="http://schemas.microsoft.com/sharepoint/v3/contenttype/forms">
-  <Display>DocumentLibraryForm</Display>
-  <Edit>DocumentLibraryForm</Edit>
-  <New>DocumentLibraryForm</New>
-</FormTemplates>
 </file>
 
 <file path=customXml/itemProps1.xml><?xml version="1.0" encoding="utf-8"?>
@@ -28105,6 +28137,14 @@
 </file>
 
 <file path=customXml/itemProps2.xml><?xml version="1.0" encoding="utf-8"?>
+<ds:datastoreItem xmlns:ds="http://schemas.openxmlformats.org/officeDocument/2006/customXml" ds:itemID="{904751AB-E840-446F-8D49-E697067EC887}">
+  <ds:schemaRefs>
+    <ds:schemaRef ds:uri="http://schemas.microsoft.com/sharepoint/v3/contenttype/forms"/>
+  </ds:schemaRefs>
+</ds:datastoreItem>
+</file>
+
+<file path=customXml/itemProps3.xml><?xml version="1.0" encoding="utf-8"?>
 <ds:datastoreItem xmlns:ds="http://schemas.openxmlformats.org/officeDocument/2006/customXml" ds:itemID="{50811A92-D464-4AC4-A396-BA73B10CEEAC}">
   <ds:schemaRefs>
     <ds:schemaRef ds:uri="71af3243-3dd4-4a8d-8c0d-dd76da1f02a5"/>
@@ -28123,14 +28163,6 @@
 </ds:datastoreItem>
 </file>
 
-<file path=customXml/itemProps3.xml><?xml version="1.0" encoding="utf-8"?>
-<ds:datastoreItem xmlns:ds="http://schemas.openxmlformats.org/officeDocument/2006/customXml" ds:itemID="{904751AB-E840-446F-8D49-E697067EC887}">
-  <ds:schemaRefs>
-    <ds:schemaRef ds:uri="http://schemas.microsoft.com/sharepoint/v3/contenttype/forms"/>
-  </ds:schemaRefs>
-</ds:datastoreItem>
-</file>
-
 <file path=docMetadata/LabelInfo.xml><?xml version="1.0" encoding="utf-8"?>
 <clbl:labelList xmlns:clbl="http://schemas.microsoft.com/office/2020/mipLabelMetadata">
   <clbl:label id="{f42aa342-8706-4288-bd11-ebb85995028c}" enabled="1" method="Standard" siteId="{72f988bf-86f1-41af-91ab-2d7cd011db47}" contentBits="0" removed="0"/>

</xml_diff>

<commit_message>
corrects some issues with unit test names;
Change-Id: Ide8066438b391ac7b64cc212d3422b8c16bfaa05
</commit_message>
<xml_diff>
--- a/PowerPoint/UnitTestingInCSharp.pptx
+++ b/PowerPoint/UnitTestingInCSharp.pptx
@@ -245,7 +245,7 @@
           <a:p>
             <a:fld id="{C17F2C1D-F243-42AB-ADF2-E7CB4E04900E}" type="datetimeFigureOut">
               <a:rPr lang="en-US" smtClean="0"/>
-              <a:t>Mon 28-Nov-2022</a:t>
+              <a:t>Tue 29-Nov-2022</a:t>
             </a:fld>
             <a:endParaRPr lang="en-US"/>
           </a:p>
@@ -422,7 +422,7 @@
           <a:p>
             <a:fld id="{020CE34E-5667-4A32-A6BA-10C7A552BC63}" type="datetimeFigureOut">
               <a:rPr lang="en-US" smtClean="0"/>
-              <a:t>Mon 28-Nov-2022</a:t>
+              <a:t>Tue 29-Nov-2022</a:t>
             </a:fld>
             <a:endParaRPr lang="en-US"/>
           </a:p>
@@ -18549,7 +18549,7 @@
             </a:pPr>
             <a:r>
               <a:rPr lang="en-US" dirty="0"/>
-              <a:t>A bit of a grey area here, but generally speaking we are treading into integration testing when we start introducing out-of-process services</a:t>
+              <a:t>A bit of a grey area here, but we are treading into integration testing when we start introducing out-of-process services</a:t>
             </a:r>
           </a:p>
           <a:p>
@@ -28088,15 +28088,6 @@
 </file>
 
 <file path=customXml/item2.xml><?xml version="1.0" encoding="utf-8"?>
-<?mso-contentType ?>
-<FormTemplates xmlns="http://schemas.microsoft.com/sharepoint/v3/contenttype/forms">
-  <Display>DocumentLibraryForm</Display>
-  <Edit>DocumentLibraryForm</Edit>
-  <New>DocumentLibraryForm</New>
-</FormTemplates>
-</file>
-
-<file path=customXml/item3.xml><?xml version="1.0" encoding="utf-8"?>
 <p:properties xmlns:p="http://schemas.microsoft.com/office/2006/metadata/properties" xmlns:xsi="http://www.w3.org/2001/XMLSchema-instance" xmlns:pc="http://schemas.microsoft.com/office/infopath/2007/PartnerControls">
   <documentManagement>
     <_ip_UnifiedCompliancePolicyUIAction xmlns="http://schemas.microsoft.com/sharepoint/v3" xsi:nil="true"/>
@@ -28113,6 +28104,15 @@
     <MediaServiceKeyPoints xmlns="71af3243-3dd4-4a8d-8c0d-dd76da1f02a5" xsi:nil="true"/>
   </documentManagement>
 </p:properties>
+</file>
+
+<file path=customXml/item3.xml><?xml version="1.0" encoding="utf-8"?>
+<?mso-contentType ?>
+<FormTemplates xmlns="http://schemas.microsoft.com/sharepoint/v3/contenttype/forms">
+  <Display>DocumentLibraryForm</Display>
+  <Edit>DocumentLibraryForm</Edit>
+  <New>DocumentLibraryForm</New>
+</FormTemplates>
 </file>
 
 <file path=customXml/itemProps1.xml><?xml version="1.0" encoding="utf-8"?>
@@ -28137,14 +28137,6 @@
 </file>
 
 <file path=customXml/itemProps2.xml><?xml version="1.0" encoding="utf-8"?>
-<ds:datastoreItem xmlns:ds="http://schemas.openxmlformats.org/officeDocument/2006/customXml" ds:itemID="{904751AB-E840-446F-8D49-E697067EC887}">
-  <ds:schemaRefs>
-    <ds:schemaRef ds:uri="http://schemas.microsoft.com/sharepoint/v3/contenttype/forms"/>
-  </ds:schemaRefs>
-</ds:datastoreItem>
-</file>
-
-<file path=customXml/itemProps3.xml><?xml version="1.0" encoding="utf-8"?>
 <ds:datastoreItem xmlns:ds="http://schemas.openxmlformats.org/officeDocument/2006/customXml" ds:itemID="{50811A92-D464-4AC4-A396-BA73B10CEEAC}">
   <ds:schemaRefs>
     <ds:schemaRef ds:uri="71af3243-3dd4-4a8d-8c0d-dd76da1f02a5"/>
@@ -28163,6 +28155,14 @@
 </ds:datastoreItem>
 </file>
 
+<file path=customXml/itemProps3.xml><?xml version="1.0" encoding="utf-8"?>
+<ds:datastoreItem xmlns:ds="http://schemas.openxmlformats.org/officeDocument/2006/customXml" ds:itemID="{904751AB-E840-446F-8D49-E697067EC887}">
+  <ds:schemaRefs>
+    <ds:schemaRef ds:uri="http://schemas.microsoft.com/sharepoint/v3/contenttype/forms"/>
+  </ds:schemaRefs>
+</ds:datastoreItem>
+</file>
+
 <file path=docMetadata/LabelInfo.xml><?xml version="1.0" encoding="utf-8"?>
 <clbl:labelList xmlns:clbl="http://schemas.microsoft.com/office/2020/mipLabelMetadata">
   <clbl:label id="{f42aa342-8706-4288-bd11-ebb85995028c}" enabled="1" method="Standard" siteId="{72f988bf-86f1-41af-91ab-2d7cd011db47}" contentBits="0" removed="0"/>

</xml_diff>